<commit_message>
Menambahkan 1 slide di file sharing session ppt
</commit_message>
<xml_diff>
--- a/Sharing Session.pptx
+++ b/Sharing Session.pptx
@@ -21,6 +21,7 @@
     <p:sldId id="269" r:id="rId15"/>
     <p:sldId id="270" r:id="rId16"/>
     <p:sldId id="264" r:id="rId17"/>
+    <p:sldId id="272" r:id="rId18"/>
   </p:sldIdLst>
   <p:sldSz cx="12192000" cy="6858000"/>
   <p:notesSz cx="6858000" cy="9144000"/>
@@ -3964,7 +3965,7 @@
           <a:p>
             <a:fld id="{39D5B9D2-73A3-43B1-A424-B21C38AD2865}" type="datetimeFigureOut">
               <a:rPr lang="en-US" smtClean="0"/>
-              <a:t>2/9/2021</a:t>
+              <a:t>2/10/2021</a:t>
             </a:fld>
             <a:endParaRPr lang="en-US"/>
           </a:p>
@@ -4162,7 +4163,7 @@
           <a:p>
             <a:fld id="{39D5B9D2-73A3-43B1-A424-B21C38AD2865}" type="datetimeFigureOut">
               <a:rPr lang="en-US" smtClean="0"/>
-              <a:t>2/9/2021</a:t>
+              <a:t>2/10/2021</a:t>
             </a:fld>
             <a:endParaRPr lang="en-US"/>
           </a:p>
@@ -4370,7 +4371,7 @@
           <a:p>
             <a:fld id="{39D5B9D2-73A3-43B1-A424-B21C38AD2865}" type="datetimeFigureOut">
               <a:rPr lang="en-US" smtClean="0"/>
-              <a:t>2/9/2021</a:t>
+              <a:t>2/10/2021</a:t>
             </a:fld>
             <a:endParaRPr lang="en-US"/>
           </a:p>
@@ -4568,7 +4569,7 @@
           <a:p>
             <a:fld id="{39D5B9D2-73A3-43B1-A424-B21C38AD2865}" type="datetimeFigureOut">
               <a:rPr lang="en-US" smtClean="0"/>
-              <a:t>2/9/2021</a:t>
+              <a:t>2/10/2021</a:t>
             </a:fld>
             <a:endParaRPr lang="en-US"/>
           </a:p>
@@ -4843,7 +4844,7 @@
           <a:p>
             <a:fld id="{39D5B9D2-73A3-43B1-A424-B21C38AD2865}" type="datetimeFigureOut">
               <a:rPr lang="en-US" smtClean="0"/>
-              <a:t>2/9/2021</a:t>
+              <a:t>2/10/2021</a:t>
             </a:fld>
             <a:endParaRPr lang="en-US"/>
           </a:p>
@@ -5108,7 +5109,7 @@
           <a:p>
             <a:fld id="{39D5B9D2-73A3-43B1-A424-B21C38AD2865}" type="datetimeFigureOut">
               <a:rPr lang="en-US" smtClean="0"/>
-              <a:t>2/9/2021</a:t>
+              <a:t>2/10/2021</a:t>
             </a:fld>
             <a:endParaRPr lang="en-US"/>
           </a:p>
@@ -5520,7 +5521,7 @@
           <a:p>
             <a:fld id="{39D5B9D2-73A3-43B1-A424-B21C38AD2865}" type="datetimeFigureOut">
               <a:rPr lang="en-US" smtClean="0"/>
-              <a:t>2/9/2021</a:t>
+              <a:t>2/10/2021</a:t>
             </a:fld>
             <a:endParaRPr lang="en-US"/>
           </a:p>
@@ -5661,7 +5662,7 @@
           <a:p>
             <a:fld id="{39D5B9D2-73A3-43B1-A424-B21C38AD2865}" type="datetimeFigureOut">
               <a:rPr lang="en-US" smtClean="0"/>
-              <a:t>2/9/2021</a:t>
+              <a:t>2/10/2021</a:t>
             </a:fld>
             <a:endParaRPr lang="en-US"/>
           </a:p>
@@ -5774,7 +5775,7 @@
           <a:p>
             <a:fld id="{39D5B9D2-73A3-43B1-A424-B21C38AD2865}" type="datetimeFigureOut">
               <a:rPr lang="en-US" smtClean="0"/>
-              <a:t>2/9/2021</a:t>
+              <a:t>2/10/2021</a:t>
             </a:fld>
             <a:endParaRPr lang="en-US"/>
           </a:p>
@@ -6085,7 +6086,7 @@
           <a:p>
             <a:fld id="{39D5B9D2-73A3-43B1-A424-B21C38AD2865}" type="datetimeFigureOut">
               <a:rPr lang="en-US" smtClean="0"/>
-              <a:t>2/9/2021</a:t>
+              <a:t>2/10/2021</a:t>
             </a:fld>
             <a:endParaRPr lang="en-US"/>
           </a:p>
@@ -6373,7 +6374,7 @@
           <a:p>
             <a:fld id="{39D5B9D2-73A3-43B1-A424-B21C38AD2865}" type="datetimeFigureOut">
               <a:rPr lang="en-US" smtClean="0"/>
-              <a:t>2/9/2021</a:t>
+              <a:t>2/10/2021</a:t>
             </a:fld>
             <a:endParaRPr lang="en-US"/>
           </a:p>
@@ -6614,7 +6615,7 @@
           <a:p>
             <a:fld id="{39D5B9D2-73A3-43B1-A424-B21C38AD2865}" type="datetimeFigureOut">
               <a:rPr lang="en-US" smtClean="0"/>
-              <a:t>2/9/2021</a:t>
+              <a:t>2/10/2021</a:t>
             </a:fld>
             <a:endParaRPr lang="en-US"/>
           </a:p>
@@ -11269,6 +11270,1241 @@
 </p:sld>
 </file>
 
+<file path=ppt/slides/slide17.xml><?xml version="1.0" encoding="utf-8"?>
+<p:sld xmlns:a="http://schemas.openxmlformats.org/drawingml/2006/main" xmlns:r="http://schemas.openxmlformats.org/officeDocument/2006/relationships" xmlns:p="http://schemas.openxmlformats.org/presentationml/2006/main">
+  <p:cSld>
+    <p:bg>
+      <p:bgPr>
+        <a:solidFill>
+          <a:schemeClr val="bg1"/>
+        </a:solidFill>
+        <a:effectLst/>
+      </p:bgPr>
+    </p:bg>
+    <p:spTree>
+      <p:nvGrpSpPr>
+        <p:cNvPr id="1" name=""/>
+        <p:cNvGrpSpPr/>
+        <p:nvPr/>
+      </p:nvGrpSpPr>
+      <p:grpSpPr>
+        <a:xfrm>
+          <a:off x="0" y="0"/>
+          <a:ext cx="0" cy="0"/>
+          <a:chOff x="0" y="0"/>
+          <a:chExt cx="0" cy="0"/>
+        </a:xfrm>
+      </p:grpSpPr>
+      <p:sp>
+        <p:nvSpPr>
+          <p:cNvPr id="7" name="Rectangle 6">
+            <a:extLst>
+              <a:ext uri="{FF2B5EF4-FFF2-40B4-BE49-F238E27FC236}">
+                <a16:creationId xmlns:a16="http://schemas.microsoft.com/office/drawing/2014/main" id="{88294908-8B00-4F58-BBBA-20F71A40AA9E}"/>
+              </a:ext>
+              <a:ext uri="{C183D7F6-B498-43B3-948B-1728B52AA6E4}">
+                <adec:decorative xmlns:adec="http://schemas.microsoft.com/office/drawing/2017/decorative" val="1"/>
+              </a:ext>
+            </a:extLst>
+          </p:cNvPr>
+          <p:cNvSpPr>
+            <a:spLocks noGrp="1" noRot="1" noChangeAspect="1" noMove="1" noResize="1" noEditPoints="1" noAdjustHandles="1" noChangeArrowheads="1" noChangeShapeType="1" noTextEdit="1"/>
+          </p:cNvSpPr>
+          <p:nvPr>
+            <p:extLst>
+              <p:ext uri="{386F3935-93C4-4BCD-93E2-E3B085C9AB24}">
+                <p16:designElem xmlns:p16="http://schemas.microsoft.com/office/powerpoint/2015/main" val="1"/>
+              </p:ext>
+            </p:extLst>
+          </p:nvPr>
+        </p:nvSpPr>
+        <p:spPr>
+          <a:xfrm>
+            <a:off x="0" y="0"/>
+            <a:ext cx="12192000" cy="6858000"/>
+          </a:xfrm>
+          <a:prstGeom prst="rect">
+            <a:avLst/>
+          </a:prstGeom>
+          <a:solidFill>
+            <a:schemeClr val="bg2"/>
+          </a:solidFill>
+          <a:ln>
+            <a:noFill/>
+          </a:ln>
+        </p:spPr>
+        <p:style>
+          <a:lnRef idx="2">
+            <a:schemeClr val="accent1">
+              <a:shade val="50000"/>
+            </a:schemeClr>
+          </a:lnRef>
+          <a:fillRef idx="1">
+            <a:schemeClr val="accent1"/>
+          </a:fillRef>
+          <a:effectRef idx="0">
+            <a:schemeClr val="accent1"/>
+          </a:effectRef>
+          <a:fontRef idx="minor">
+            <a:schemeClr val="lt1"/>
+          </a:fontRef>
+        </p:style>
+        <p:txBody>
+          <a:bodyPr rtlCol="0" anchor="ctr"/>
+          <a:lstStyle/>
+          <a:p>
+            <a:pPr algn="ctr"/>
+            <a:endParaRPr lang="en-US" dirty="0"/>
+          </a:p>
+        </p:txBody>
+      </p:sp>
+      <p:sp>
+        <p:nvSpPr>
+          <p:cNvPr id="9" name="Freeform: Shape 8">
+            <a:extLst>
+              <a:ext uri="{FF2B5EF4-FFF2-40B4-BE49-F238E27FC236}">
+                <a16:creationId xmlns:a16="http://schemas.microsoft.com/office/drawing/2014/main" id="{4364C879-1404-4203-8E9D-CC5DE0A621A2}"/>
+              </a:ext>
+              <a:ext uri="{C183D7F6-B498-43B3-948B-1728B52AA6E4}">
+                <adec:decorative xmlns:adec="http://schemas.microsoft.com/office/drawing/2017/decorative" val="1"/>
+              </a:ext>
+            </a:extLst>
+          </p:cNvPr>
+          <p:cNvSpPr>
+            <a:spLocks noGrp="1" noRot="1" noChangeAspect="1" noMove="1" noResize="1" noEditPoints="1" noAdjustHandles="1" noChangeArrowheads="1" noChangeShapeType="1" noTextEdit="1"/>
+          </p:cNvSpPr>
+          <p:nvPr>
+            <p:extLst>
+              <p:ext uri="{386F3935-93C4-4BCD-93E2-E3B085C9AB24}">
+                <p16:designElem xmlns:p16="http://schemas.microsoft.com/office/powerpoint/2015/main" val="1"/>
+              </p:ext>
+            </p:extLst>
+          </p:nvPr>
+        </p:nvSpPr>
+        <p:spPr>
+          <a:xfrm rot="2700000">
+            <a:off x="82782" y="-1386168"/>
+            <a:ext cx="2424873" cy="3611191"/>
+          </a:xfrm>
+          <a:custGeom>
+            <a:avLst/>
+            <a:gdLst>
+              <a:gd name="connsiteX0" fmla="*/ 0 w 2424873"/>
+              <a:gd name="connsiteY0" fmla="*/ 2424874 h 3611191"/>
+              <a:gd name="connsiteX1" fmla="*/ 2424873 w 2424873"/>
+              <a:gd name="connsiteY1" fmla="*/ 0 h 3611191"/>
+              <a:gd name="connsiteX2" fmla="*/ 2424873 w 2424873"/>
+              <a:gd name="connsiteY2" fmla="*/ 3611191 h 3611191"/>
+              <a:gd name="connsiteX3" fmla="*/ 1186317 w 2424873"/>
+              <a:gd name="connsiteY3" fmla="*/ 3611191 h 3611191"/>
+            </a:gdLst>
+            <a:ahLst/>
+            <a:cxnLst>
+              <a:cxn ang="0">
+                <a:pos x="connsiteX0" y="connsiteY0"/>
+              </a:cxn>
+              <a:cxn ang="0">
+                <a:pos x="connsiteX1" y="connsiteY1"/>
+              </a:cxn>
+              <a:cxn ang="0">
+                <a:pos x="connsiteX2" y="connsiteY2"/>
+              </a:cxn>
+              <a:cxn ang="0">
+                <a:pos x="connsiteX3" y="connsiteY3"/>
+              </a:cxn>
+            </a:cxnLst>
+            <a:rect l="l" t="t" r="r" b="b"/>
+            <a:pathLst>
+              <a:path w="2424873" h="3611191">
+                <a:moveTo>
+                  <a:pt x="0" y="2424874"/>
+                </a:moveTo>
+                <a:lnTo>
+                  <a:pt x="2424873" y="0"/>
+                </a:lnTo>
+                <a:lnTo>
+                  <a:pt x="2424873" y="3611191"/>
+                </a:lnTo>
+                <a:lnTo>
+                  <a:pt x="1186317" y="3611191"/>
+                </a:lnTo>
+                <a:close/>
+              </a:path>
+            </a:pathLst>
+          </a:custGeom>
+          <a:solidFill>
+            <a:schemeClr val="accent4">
+              <a:alpha val="40000"/>
+            </a:schemeClr>
+          </a:solidFill>
+          <a:ln>
+            <a:noFill/>
+          </a:ln>
+        </p:spPr>
+        <p:style>
+          <a:lnRef idx="2">
+            <a:schemeClr val="accent1">
+              <a:shade val="50000"/>
+            </a:schemeClr>
+          </a:lnRef>
+          <a:fillRef idx="1">
+            <a:schemeClr val="accent1"/>
+          </a:fillRef>
+          <a:effectRef idx="0">
+            <a:schemeClr val="accent1"/>
+          </a:effectRef>
+          <a:fontRef idx="minor">
+            <a:schemeClr val="lt1"/>
+          </a:fontRef>
+        </p:style>
+        <p:txBody>
+          <a:bodyPr wrap="square" rtlCol="0" anchor="ctr">
+            <a:noAutofit/>
+          </a:bodyPr>
+          <a:lstStyle/>
+          <a:p>
+            <a:pPr algn="ctr"/>
+            <a:endParaRPr lang="en-US"/>
+          </a:p>
+        </p:txBody>
+      </p:sp>
+      <p:sp>
+        <p:nvSpPr>
+          <p:cNvPr id="11" name="Freeform: Shape 10">
+            <a:extLst>
+              <a:ext uri="{FF2B5EF4-FFF2-40B4-BE49-F238E27FC236}">
+                <a16:creationId xmlns:a16="http://schemas.microsoft.com/office/drawing/2014/main" id="{84617302-4B0D-4351-A6BB-6F0930D943AC}"/>
+              </a:ext>
+              <a:ext uri="{C183D7F6-B498-43B3-948B-1728B52AA6E4}">
+                <adec:decorative xmlns:adec="http://schemas.microsoft.com/office/drawing/2017/decorative" val="1"/>
+              </a:ext>
+            </a:extLst>
+          </p:cNvPr>
+          <p:cNvSpPr>
+            <a:spLocks noGrp="1" noRot="1" noChangeAspect="1" noMove="1" noResize="1" noEditPoints="1" noAdjustHandles="1" noChangeArrowheads="1" noChangeShapeType="1" noTextEdit="1"/>
+          </p:cNvSpPr>
+          <p:nvPr>
+            <p:extLst>
+              <p:ext uri="{386F3935-93C4-4BCD-93E2-E3B085C9AB24}">
+                <p16:designElem xmlns:p16="http://schemas.microsoft.com/office/powerpoint/2015/main" val="1"/>
+              </p:ext>
+            </p:extLst>
+          </p:nvPr>
+        </p:nvSpPr>
+        <p:spPr>
+          <a:xfrm rot="2700000">
+            <a:off x="1571000" y="-338582"/>
+            <a:ext cx="1635955" cy="1635955"/>
+          </a:xfrm>
+          <a:custGeom>
+            <a:avLst/>
+            <a:gdLst>
+              <a:gd name="connsiteX0" fmla="*/ 0 w 1635955"/>
+              <a:gd name="connsiteY0" fmla="*/ 957987 h 1635955"/>
+              <a:gd name="connsiteX1" fmla="*/ 957987 w 1635955"/>
+              <a:gd name="connsiteY1" fmla="*/ 0 h 1635955"/>
+              <a:gd name="connsiteX2" fmla="*/ 1635955 w 1635955"/>
+              <a:gd name="connsiteY2" fmla="*/ 0 h 1635955"/>
+              <a:gd name="connsiteX3" fmla="*/ 1635955 w 1635955"/>
+              <a:gd name="connsiteY3" fmla="*/ 1635955 h 1635955"/>
+              <a:gd name="connsiteX4" fmla="*/ 0 w 1635955"/>
+              <a:gd name="connsiteY4" fmla="*/ 1635955 h 1635955"/>
+            </a:gdLst>
+            <a:ahLst/>
+            <a:cxnLst>
+              <a:cxn ang="0">
+                <a:pos x="connsiteX0" y="connsiteY0"/>
+              </a:cxn>
+              <a:cxn ang="0">
+                <a:pos x="connsiteX1" y="connsiteY1"/>
+              </a:cxn>
+              <a:cxn ang="0">
+                <a:pos x="connsiteX2" y="connsiteY2"/>
+              </a:cxn>
+              <a:cxn ang="0">
+                <a:pos x="connsiteX3" y="connsiteY3"/>
+              </a:cxn>
+              <a:cxn ang="0">
+                <a:pos x="connsiteX4" y="connsiteY4"/>
+              </a:cxn>
+            </a:cxnLst>
+            <a:rect l="l" t="t" r="r" b="b"/>
+            <a:pathLst>
+              <a:path w="1635955" h="1635955">
+                <a:moveTo>
+                  <a:pt x="0" y="957987"/>
+                </a:moveTo>
+                <a:lnTo>
+                  <a:pt x="957987" y="0"/>
+                </a:lnTo>
+                <a:lnTo>
+                  <a:pt x="1635955" y="0"/>
+                </a:lnTo>
+                <a:lnTo>
+                  <a:pt x="1635955" y="1635955"/>
+                </a:lnTo>
+                <a:lnTo>
+                  <a:pt x="0" y="1635955"/>
+                </a:lnTo>
+                <a:close/>
+              </a:path>
+            </a:pathLst>
+          </a:custGeom>
+          <a:solidFill>
+            <a:schemeClr val="accent4">
+              <a:alpha val="40000"/>
+            </a:schemeClr>
+          </a:solidFill>
+          <a:ln>
+            <a:noFill/>
+          </a:ln>
+        </p:spPr>
+        <p:style>
+          <a:lnRef idx="2">
+            <a:schemeClr val="accent1">
+              <a:shade val="50000"/>
+            </a:schemeClr>
+          </a:lnRef>
+          <a:fillRef idx="1">
+            <a:schemeClr val="accent1"/>
+          </a:fillRef>
+          <a:effectRef idx="0">
+            <a:schemeClr val="accent1"/>
+          </a:effectRef>
+          <a:fontRef idx="minor">
+            <a:schemeClr val="lt1"/>
+          </a:fontRef>
+        </p:style>
+        <p:txBody>
+          <a:bodyPr wrap="square" rtlCol="0" anchor="ctr">
+            <a:noAutofit/>
+          </a:bodyPr>
+          <a:lstStyle/>
+          <a:p>
+            <a:pPr algn="ctr"/>
+            <a:endParaRPr lang="en-US"/>
+          </a:p>
+        </p:txBody>
+      </p:sp>
+      <p:sp>
+        <p:nvSpPr>
+          <p:cNvPr id="13" name="Freeform: Shape 12">
+            <a:extLst>
+              <a:ext uri="{FF2B5EF4-FFF2-40B4-BE49-F238E27FC236}">
+                <a16:creationId xmlns:a16="http://schemas.microsoft.com/office/drawing/2014/main" id="{DA2C7802-C2E0-4218-8F89-8DD7CCD2CD1C}"/>
+              </a:ext>
+              <a:ext uri="{C183D7F6-B498-43B3-948B-1728B52AA6E4}">
+                <adec:decorative xmlns:adec="http://schemas.microsoft.com/office/drawing/2017/decorative" val="1"/>
+              </a:ext>
+            </a:extLst>
+          </p:cNvPr>
+          <p:cNvSpPr>
+            <a:spLocks noGrp="1" noRot="1" noChangeAspect="1" noMove="1" noResize="1" noEditPoints="1" noAdjustHandles="1" noChangeArrowheads="1" noChangeShapeType="1" noTextEdit="1"/>
+          </p:cNvSpPr>
+          <p:nvPr>
+            <p:extLst>
+              <p:ext uri="{386F3935-93C4-4BCD-93E2-E3B085C9AB24}">
+                <p16:designElem xmlns:p16="http://schemas.microsoft.com/office/powerpoint/2015/main" val="1"/>
+              </p:ext>
+            </p:extLst>
+          </p:nvPr>
+        </p:nvSpPr>
+        <p:spPr>
+          <a:xfrm rot="2700000">
+            <a:off x="9627985" y="-6588"/>
+            <a:ext cx="4059393" cy="2548110"/>
+          </a:xfrm>
+          <a:custGeom>
+            <a:avLst/>
+            <a:gdLst>
+              <a:gd name="connsiteX0" fmla="*/ 0 w 4059393"/>
+              <a:gd name="connsiteY0" fmla="*/ 1511282 h 2548110"/>
+              <a:gd name="connsiteX1" fmla="*/ 1511282 w 4059393"/>
+              <a:gd name="connsiteY1" fmla="*/ 0 h 2548110"/>
+              <a:gd name="connsiteX2" fmla="*/ 4059393 w 4059393"/>
+              <a:gd name="connsiteY2" fmla="*/ 2548110 h 2548110"/>
+              <a:gd name="connsiteX3" fmla="*/ 0 w 4059393"/>
+              <a:gd name="connsiteY3" fmla="*/ 2548110 h 2548110"/>
+            </a:gdLst>
+            <a:ahLst/>
+            <a:cxnLst>
+              <a:cxn ang="0">
+                <a:pos x="connsiteX0" y="connsiteY0"/>
+              </a:cxn>
+              <a:cxn ang="0">
+                <a:pos x="connsiteX1" y="connsiteY1"/>
+              </a:cxn>
+              <a:cxn ang="0">
+                <a:pos x="connsiteX2" y="connsiteY2"/>
+              </a:cxn>
+              <a:cxn ang="0">
+                <a:pos x="connsiteX3" y="connsiteY3"/>
+              </a:cxn>
+            </a:cxnLst>
+            <a:rect l="l" t="t" r="r" b="b"/>
+            <a:pathLst>
+              <a:path w="4059393" h="2548110">
+                <a:moveTo>
+                  <a:pt x="0" y="1511282"/>
+                </a:moveTo>
+                <a:lnTo>
+                  <a:pt x="1511282" y="0"/>
+                </a:lnTo>
+                <a:lnTo>
+                  <a:pt x="4059393" y="2548110"/>
+                </a:lnTo>
+                <a:lnTo>
+                  <a:pt x="0" y="2548110"/>
+                </a:lnTo>
+                <a:close/>
+              </a:path>
+            </a:pathLst>
+          </a:custGeom>
+          <a:solidFill>
+            <a:schemeClr val="accent1">
+              <a:alpha val="30000"/>
+            </a:schemeClr>
+          </a:solidFill>
+          <a:ln>
+            <a:noFill/>
+          </a:ln>
+        </p:spPr>
+        <p:style>
+          <a:lnRef idx="2">
+            <a:schemeClr val="accent1">
+              <a:shade val="50000"/>
+            </a:schemeClr>
+          </a:lnRef>
+          <a:fillRef idx="1">
+            <a:schemeClr val="accent1"/>
+          </a:fillRef>
+          <a:effectRef idx="0">
+            <a:schemeClr val="accent1"/>
+          </a:effectRef>
+          <a:fontRef idx="minor">
+            <a:schemeClr val="lt1"/>
+          </a:fontRef>
+        </p:style>
+        <p:txBody>
+          <a:bodyPr wrap="square" rtlCol="0" anchor="ctr">
+            <a:noAutofit/>
+          </a:bodyPr>
+          <a:lstStyle/>
+          <a:p>
+            <a:pPr algn="ctr"/>
+            <a:endParaRPr lang="en-US"/>
+          </a:p>
+        </p:txBody>
+      </p:sp>
+      <p:sp>
+        <p:nvSpPr>
+          <p:cNvPr id="15" name="Rectangle 14">
+            <a:extLst>
+              <a:ext uri="{FF2B5EF4-FFF2-40B4-BE49-F238E27FC236}">
+                <a16:creationId xmlns:a16="http://schemas.microsoft.com/office/drawing/2014/main" id="{A6D7111A-21E5-4EE9-8A78-10E5530F0116}"/>
+              </a:ext>
+              <a:ext uri="{C183D7F6-B498-43B3-948B-1728B52AA6E4}">
+                <adec:decorative xmlns:adec="http://schemas.microsoft.com/office/drawing/2017/decorative" val="1"/>
+              </a:ext>
+            </a:extLst>
+          </p:cNvPr>
+          <p:cNvSpPr>
+            <a:spLocks noGrp="1" noRot="1" noChangeAspect="1" noMove="1" noResize="1" noEditPoints="1" noAdjustHandles="1" noChangeArrowheads="1" noChangeShapeType="1" noTextEdit="1"/>
+          </p:cNvSpPr>
+          <p:nvPr>
+            <p:extLst>
+              <p:ext uri="{386F3935-93C4-4BCD-93E2-E3B085C9AB24}">
+                <p16:designElem xmlns:p16="http://schemas.microsoft.com/office/powerpoint/2015/main" val="1"/>
+              </p:ext>
+            </p:extLst>
+          </p:nvPr>
+        </p:nvSpPr>
+        <p:spPr>
+          <a:xfrm rot="2700000">
+            <a:off x="10262924" y="1465780"/>
+            <a:ext cx="1185708" cy="1185708"/>
+          </a:xfrm>
+          <a:prstGeom prst="rect">
+            <a:avLst/>
+          </a:prstGeom>
+          <a:solidFill>
+            <a:schemeClr val="accent1">
+              <a:alpha val="30000"/>
+            </a:schemeClr>
+          </a:solidFill>
+          <a:ln>
+            <a:noFill/>
+          </a:ln>
+        </p:spPr>
+        <p:style>
+          <a:lnRef idx="2">
+            <a:schemeClr val="accent1">
+              <a:shade val="50000"/>
+            </a:schemeClr>
+          </a:lnRef>
+          <a:fillRef idx="1">
+            <a:schemeClr val="accent1"/>
+          </a:fillRef>
+          <a:effectRef idx="0">
+            <a:schemeClr val="accent1"/>
+          </a:effectRef>
+          <a:fontRef idx="minor">
+            <a:schemeClr val="lt1"/>
+          </a:fontRef>
+        </p:style>
+        <p:txBody>
+          <a:bodyPr wrap="square" rtlCol="0" anchor="ctr">
+            <a:noAutofit/>
+          </a:bodyPr>
+          <a:lstStyle/>
+          <a:p>
+            <a:pPr algn="ctr"/>
+            <a:endParaRPr lang="en-US"/>
+          </a:p>
+        </p:txBody>
+      </p:sp>
+      <p:sp>
+        <p:nvSpPr>
+          <p:cNvPr id="17" name="Freeform: Shape 16">
+            <a:extLst>
+              <a:ext uri="{FF2B5EF4-FFF2-40B4-BE49-F238E27FC236}">
+                <a16:creationId xmlns:a16="http://schemas.microsoft.com/office/drawing/2014/main" id="{A3969E80-A77B-49FC-9122-D89AFD5EE118}"/>
+              </a:ext>
+              <a:ext uri="{C183D7F6-B498-43B3-948B-1728B52AA6E4}">
+                <adec:decorative xmlns:adec="http://schemas.microsoft.com/office/drawing/2017/decorative" val="1"/>
+              </a:ext>
+            </a:extLst>
+          </p:cNvPr>
+          <p:cNvSpPr>
+            <a:spLocks noGrp="1" noRot="1" noChangeAspect="1" noMove="1" noResize="1" noEditPoints="1" noAdjustHandles="1" noChangeArrowheads="1" noChangeShapeType="1" noTextEdit="1"/>
+          </p:cNvSpPr>
+          <p:nvPr>
+            <p:extLst>
+              <p:ext uri="{386F3935-93C4-4BCD-93E2-E3B085C9AB24}">
+                <p16:designElem xmlns:p16="http://schemas.microsoft.com/office/powerpoint/2015/main" val="1"/>
+              </p:ext>
+            </p:extLst>
+          </p:nvPr>
+        </p:nvSpPr>
+        <p:spPr>
+          <a:xfrm rot="2700000">
+            <a:off x="-29557" y="5198743"/>
+            <a:ext cx="2444907" cy="2366116"/>
+          </a:xfrm>
+          <a:custGeom>
+            <a:avLst/>
+            <a:gdLst>
+              <a:gd name="connsiteX0" fmla="*/ 0 w 2203753"/>
+              <a:gd name="connsiteY0" fmla="*/ 0 h 2132734"/>
+              <a:gd name="connsiteX1" fmla="*/ 2203753 w 2203753"/>
+              <a:gd name="connsiteY1" fmla="*/ 0 h 2132734"/>
+              <a:gd name="connsiteX2" fmla="*/ 2203753 w 2203753"/>
+              <a:gd name="connsiteY2" fmla="*/ 576461 h 2132734"/>
+              <a:gd name="connsiteX3" fmla="*/ 647480 w 2203753"/>
+              <a:gd name="connsiteY3" fmla="*/ 2132734 h 2132734"/>
+              <a:gd name="connsiteX4" fmla="*/ 0 w 2203753"/>
+              <a:gd name="connsiteY4" fmla="*/ 1485255 h 2132734"/>
+            </a:gdLst>
+            <a:ahLst/>
+            <a:cxnLst>
+              <a:cxn ang="0">
+                <a:pos x="connsiteX0" y="connsiteY0"/>
+              </a:cxn>
+              <a:cxn ang="0">
+                <a:pos x="connsiteX1" y="connsiteY1"/>
+              </a:cxn>
+              <a:cxn ang="0">
+                <a:pos x="connsiteX2" y="connsiteY2"/>
+              </a:cxn>
+              <a:cxn ang="0">
+                <a:pos x="connsiteX3" y="connsiteY3"/>
+              </a:cxn>
+              <a:cxn ang="0">
+                <a:pos x="connsiteX4" y="connsiteY4"/>
+              </a:cxn>
+            </a:cxnLst>
+            <a:rect l="l" t="t" r="r" b="b"/>
+            <a:pathLst>
+              <a:path w="2203753" h="2132734">
+                <a:moveTo>
+                  <a:pt x="0" y="0"/>
+                </a:moveTo>
+                <a:lnTo>
+                  <a:pt x="2203753" y="0"/>
+                </a:lnTo>
+                <a:lnTo>
+                  <a:pt x="2203753" y="576461"/>
+                </a:lnTo>
+                <a:lnTo>
+                  <a:pt x="647480" y="2132734"/>
+                </a:lnTo>
+                <a:lnTo>
+                  <a:pt x="0" y="1485255"/>
+                </a:lnTo>
+                <a:close/>
+              </a:path>
+            </a:pathLst>
+          </a:custGeom>
+          <a:solidFill>
+            <a:schemeClr val="accent1">
+              <a:alpha val="30000"/>
+            </a:schemeClr>
+          </a:solidFill>
+          <a:ln>
+            <a:noFill/>
+          </a:ln>
+        </p:spPr>
+        <p:style>
+          <a:lnRef idx="2">
+            <a:schemeClr val="accent1">
+              <a:shade val="50000"/>
+            </a:schemeClr>
+          </a:lnRef>
+          <a:fillRef idx="1">
+            <a:schemeClr val="accent1"/>
+          </a:fillRef>
+          <a:effectRef idx="0">
+            <a:schemeClr val="accent1"/>
+          </a:effectRef>
+          <a:fontRef idx="minor">
+            <a:schemeClr val="lt1"/>
+          </a:fontRef>
+        </p:style>
+        <p:txBody>
+          <a:bodyPr wrap="square" rtlCol="0" anchor="ctr">
+            <a:noAutofit/>
+          </a:bodyPr>
+          <a:lstStyle/>
+          <a:p>
+            <a:pPr algn="ctr"/>
+            <a:endParaRPr lang="en-US"/>
+          </a:p>
+        </p:txBody>
+      </p:sp>
+      <p:sp>
+        <p:nvSpPr>
+          <p:cNvPr id="19" name="Rectangle 18">
+            <a:extLst>
+              <a:ext uri="{FF2B5EF4-FFF2-40B4-BE49-F238E27FC236}">
+                <a16:creationId xmlns:a16="http://schemas.microsoft.com/office/drawing/2014/main" id="{1849CA57-76BD-4CF2-80BA-D7A46A01B7B1}"/>
+              </a:ext>
+              <a:ext uri="{C183D7F6-B498-43B3-948B-1728B52AA6E4}">
+                <adec:decorative xmlns:adec="http://schemas.microsoft.com/office/drawing/2017/decorative" val="1"/>
+              </a:ext>
+            </a:extLst>
+          </p:cNvPr>
+          <p:cNvSpPr>
+            <a:spLocks noGrp="1" noRot="1" noChangeAspect="1" noMove="1" noResize="1" noEditPoints="1" noAdjustHandles="1" noChangeArrowheads="1" noChangeShapeType="1" noTextEdit="1"/>
+          </p:cNvSpPr>
+          <p:nvPr>
+            <p:extLst>
+              <p:ext uri="{386F3935-93C4-4BCD-93E2-E3B085C9AB24}">
+                <p16:designElem xmlns:p16="http://schemas.microsoft.com/office/powerpoint/2015/main" val="1"/>
+              </p:ext>
+            </p:extLst>
+          </p:nvPr>
+        </p:nvSpPr>
+        <p:spPr>
+          <a:xfrm rot="2700000">
+            <a:off x="1769787" y="5439893"/>
+            <a:ext cx="928467" cy="928467"/>
+          </a:xfrm>
+          <a:prstGeom prst="rect">
+            <a:avLst/>
+          </a:prstGeom>
+          <a:solidFill>
+            <a:schemeClr val="accent1">
+              <a:alpha val="30000"/>
+            </a:schemeClr>
+          </a:solidFill>
+          <a:ln>
+            <a:noFill/>
+          </a:ln>
+        </p:spPr>
+        <p:style>
+          <a:lnRef idx="2">
+            <a:schemeClr val="accent1">
+              <a:shade val="50000"/>
+            </a:schemeClr>
+          </a:lnRef>
+          <a:fillRef idx="1">
+            <a:schemeClr val="accent1"/>
+          </a:fillRef>
+          <a:effectRef idx="0">
+            <a:schemeClr val="accent1"/>
+          </a:effectRef>
+          <a:fontRef idx="minor">
+            <a:schemeClr val="lt1"/>
+          </a:fontRef>
+        </p:style>
+        <p:txBody>
+          <a:bodyPr wrap="square" rtlCol="0" anchor="ctr">
+            <a:noAutofit/>
+          </a:bodyPr>
+          <a:lstStyle/>
+          <a:p>
+            <a:pPr algn="ctr"/>
+            <a:endParaRPr lang="en-US">
+              <a:solidFill>
+                <a:srgbClr val="FFFFFF"/>
+              </a:solidFill>
+              <a:effectLst>
+                <a:outerShdw blurRad="38100" dist="38100" dir="2700000" algn="tl">
+                  <a:srgbClr val="000000">
+                    <a:alpha val="43137"/>
+                  </a:srgbClr>
+                </a:outerShdw>
+              </a:effectLst>
+            </a:endParaRPr>
+          </a:p>
+        </p:txBody>
+      </p:sp>
+      <p:sp>
+        <p:nvSpPr>
+          <p:cNvPr id="21" name="Freeform: Shape 20">
+            <a:extLst>
+              <a:ext uri="{FF2B5EF4-FFF2-40B4-BE49-F238E27FC236}">
+                <a16:creationId xmlns:a16="http://schemas.microsoft.com/office/drawing/2014/main" id="{35E9085E-E730-4768-83D4-6CB7E9897153}"/>
+              </a:ext>
+              <a:ext uri="{C183D7F6-B498-43B3-948B-1728B52AA6E4}">
+                <adec:decorative xmlns:adec="http://schemas.microsoft.com/office/drawing/2017/decorative" val="1"/>
+              </a:ext>
+            </a:extLst>
+          </p:cNvPr>
+          <p:cNvSpPr>
+            <a:spLocks noGrp="1" noRot="1" noChangeAspect="1" noMove="1" noResize="1" noEditPoints="1" noAdjustHandles="1" noChangeArrowheads="1" noChangeShapeType="1" noTextEdit="1"/>
+          </p:cNvSpPr>
+          <p:nvPr>
+            <p:extLst>
+              <p:ext uri="{386F3935-93C4-4BCD-93E2-E3B085C9AB24}">
+                <p16:designElem xmlns:p16="http://schemas.microsoft.com/office/powerpoint/2015/main" val="1"/>
+              </p:ext>
+            </p:extLst>
+          </p:nvPr>
+        </p:nvSpPr>
+        <p:spPr>
+          <a:xfrm rot="2700000">
+            <a:off x="3401311" y="734311"/>
+            <a:ext cx="5389379" cy="5389379"/>
+          </a:xfrm>
+          <a:custGeom>
+            <a:avLst/>
+            <a:gdLst>
+              <a:gd name="connsiteX0" fmla="*/ 0 w 5389379"/>
+              <a:gd name="connsiteY0" fmla="*/ 540040 h 5389379"/>
+              <a:gd name="connsiteX1" fmla="*/ 540040 w 5389379"/>
+              <a:gd name="connsiteY1" fmla="*/ 0 h 5389379"/>
+              <a:gd name="connsiteX2" fmla="*/ 5389379 w 5389379"/>
+              <a:gd name="connsiteY2" fmla="*/ 0 h 5389379"/>
+              <a:gd name="connsiteX3" fmla="*/ 5389379 w 5389379"/>
+              <a:gd name="connsiteY3" fmla="*/ 4838655 h 5389379"/>
+              <a:gd name="connsiteX4" fmla="*/ 4838655 w 5389379"/>
+              <a:gd name="connsiteY4" fmla="*/ 5389379 h 5389379"/>
+              <a:gd name="connsiteX5" fmla="*/ 0 w 5389379"/>
+              <a:gd name="connsiteY5" fmla="*/ 5389379 h 5389379"/>
+            </a:gdLst>
+            <a:ahLst/>
+            <a:cxnLst>
+              <a:cxn ang="0">
+                <a:pos x="connsiteX0" y="connsiteY0"/>
+              </a:cxn>
+              <a:cxn ang="0">
+                <a:pos x="connsiteX1" y="connsiteY1"/>
+              </a:cxn>
+              <a:cxn ang="0">
+                <a:pos x="connsiteX2" y="connsiteY2"/>
+              </a:cxn>
+              <a:cxn ang="0">
+                <a:pos x="connsiteX3" y="connsiteY3"/>
+              </a:cxn>
+              <a:cxn ang="0">
+                <a:pos x="connsiteX4" y="connsiteY4"/>
+              </a:cxn>
+              <a:cxn ang="0">
+                <a:pos x="connsiteX5" y="connsiteY5"/>
+              </a:cxn>
+            </a:cxnLst>
+            <a:rect l="l" t="t" r="r" b="b"/>
+            <a:pathLst>
+              <a:path w="5389379" h="5389379">
+                <a:moveTo>
+                  <a:pt x="0" y="540040"/>
+                </a:moveTo>
+                <a:lnTo>
+                  <a:pt x="540040" y="0"/>
+                </a:lnTo>
+                <a:lnTo>
+                  <a:pt x="5389379" y="0"/>
+                </a:lnTo>
+                <a:lnTo>
+                  <a:pt x="5389379" y="4838655"/>
+                </a:lnTo>
+                <a:lnTo>
+                  <a:pt x="4838655" y="5389379"/>
+                </a:lnTo>
+                <a:lnTo>
+                  <a:pt x="0" y="5389379"/>
+                </a:lnTo>
+                <a:close/>
+              </a:path>
+            </a:pathLst>
+          </a:custGeom>
+          <a:solidFill>
+            <a:srgbClr val="FFFFFF"/>
+          </a:solidFill>
+          <a:ln>
+            <a:noFill/>
+          </a:ln>
+        </p:spPr>
+        <p:style>
+          <a:lnRef idx="2">
+            <a:schemeClr val="accent1">
+              <a:shade val="50000"/>
+            </a:schemeClr>
+          </a:lnRef>
+          <a:fillRef idx="1">
+            <a:schemeClr val="accent1"/>
+          </a:fillRef>
+          <a:effectRef idx="0">
+            <a:schemeClr val="accent1"/>
+          </a:effectRef>
+          <a:fontRef idx="minor">
+            <a:schemeClr val="lt1"/>
+          </a:fontRef>
+        </p:style>
+        <p:txBody>
+          <a:bodyPr wrap="square" rtlCol="0" anchor="ctr">
+            <a:noAutofit/>
+          </a:bodyPr>
+          <a:lstStyle/>
+          <a:p>
+            <a:pPr algn="ctr"/>
+            <a:endParaRPr lang="en-US"/>
+          </a:p>
+        </p:txBody>
+      </p:sp>
+      <p:sp>
+        <p:nvSpPr>
+          <p:cNvPr id="2" name="TextBox 1">
+            <a:extLst>
+              <a:ext uri="{FF2B5EF4-FFF2-40B4-BE49-F238E27FC236}">
+                <a16:creationId xmlns:a16="http://schemas.microsoft.com/office/drawing/2014/main" id="{63A32583-8C4A-4B12-B008-9A90FCFCEC9F}"/>
+              </a:ext>
+            </a:extLst>
+          </p:cNvPr>
+          <p:cNvSpPr txBox="1"/>
+          <p:nvPr/>
+        </p:nvSpPr>
+        <p:spPr>
+          <a:xfrm>
+            <a:off x="3204642" y="2353641"/>
+            <a:ext cx="5782716" cy="2150719"/>
+          </a:xfrm>
+          <a:prstGeom prst="rect">
+            <a:avLst/>
+          </a:prstGeom>
+          <a:noFill/>
+        </p:spPr>
+        <p:txBody>
+          <a:bodyPr vert="horz" lIns="91440" tIns="45720" rIns="91440" bIns="45720" rtlCol="0" anchor="ctr">
+            <a:normAutofit/>
+          </a:bodyPr>
+          <a:lstStyle/>
+          <a:p>
+            <a:pPr algn="ctr">
+              <a:lnSpc>
+                <a:spcPct val="90000"/>
+              </a:lnSpc>
+              <a:spcBef>
+                <a:spcPct val="0"/>
+              </a:spcBef>
+              <a:spcAft>
+                <a:spcPts val="600"/>
+              </a:spcAft>
+            </a:pPr>
+            <a:r>
+              <a:rPr lang="en-US" sz="4800" kern="1200" dirty="0">
+                <a:solidFill>
+                  <a:srgbClr val="080808"/>
+                </a:solidFill>
+                <a:latin typeface="+mj-lt"/>
+                <a:ea typeface="+mj-ea"/>
+                <a:cs typeface="+mj-cs"/>
+              </a:rPr>
+              <a:t>TERIMAKASIH</a:t>
+            </a:r>
+          </a:p>
+        </p:txBody>
+      </p:sp>
+      <p:sp>
+        <p:nvSpPr>
+          <p:cNvPr id="23" name="Freeform: Shape 22">
+            <a:extLst>
+              <a:ext uri="{FF2B5EF4-FFF2-40B4-BE49-F238E27FC236}">
+                <a16:creationId xmlns:a16="http://schemas.microsoft.com/office/drawing/2014/main" id="{973272FE-A474-4CAE-8CA2-BCC8B476C3F4}"/>
+              </a:ext>
+              <a:ext uri="{C183D7F6-B498-43B3-948B-1728B52AA6E4}">
+                <adec:decorative xmlns:adec="http://schemas.microsoft.com/office/drawing/2017/decorative" val="1"/>
+              </a:ext>
+            </a:extLst>
+          </p:cNvPr>
+          <p:cNvSpPr>
+            <a:spLocks noGrp="1" noRot="1" noChangeAspect="1" noMove="1" noResize="1" noEditPoints="1" noAdjustHandles="1" noChangeArrowheads="1" noChangeShapeType="1" noTextEdit="1"/>
+          </p:cNvSpPr>
+          <p:nvPr>
+            <p:extLst>
+              <p:ext uri="{386F3935-93C4-4BCD-93E2-E3B085C9AB24}">
+                <p16:designElem xmlns:p16="http://schemas.microsoft.com/office/powerpoint/2015/main" val="1"/>
+              </p:ext>
+            </p:extLst>
+          </p:nvPr>
+        </p:nvSpPr>
+        <p:spPr>
+          <a:xfrm rot="2700000">
+            <a:off x="2700283" y="33283"/>
+            <a:ext cx="6791435" cy="6791435"/>
+          </a:xfrm>
+          <a:custGeom>
+            <a:avLst/>
+            <a:gdLst>
+              <a:gd name="connsiteX0" fmla="*/ 1860938 w 6791435"/>
+              <a:gd name="connsiteY0" fmla="*/ 81158 h 6791435"/>
+              <a:gd name="connsiteX1" fmla="*/ 1942096 w 6791435"/>
+              <a:gd name="connsiteY1" fmla="*/ 0 h 6791435"/>
+              <a:gd name="connsiteX2" fmla="*/ 6791435 w 6791435"/>
+              <a:gd name="connsiteY2" fmla="*/ 0 h 6791435"/>
+              <a:gd name="connsiteX3" fmla="*/ 6791435 w 6791435"/>
+              <a:gd name="connsiteY3" fmla="*/ 4838655 h 6791435"/>
+              <a:gd name="connsiteX4" fmla="*/ 6710277 w 6791435"/>
+              <a:gd name="connsiteY4" fmla="*/ 4919813 h 6791435"/>
+              <a:gd name="connsiteX5" fmla="*/ 6710277 w 6791435"/>
+              <a:gd name="connsiteY5" fmla="*/ 81158 h 6791435"/>
+              <a:gd name="connsiteX6" fmla="*/ 0 w 6791435"/>
+              <a:gd name="connsiteY6" fmla="*/ 1942096 h 6791435"/>
+              <a:gd name="connsiteX7" fmla="*/ 81158 w 6791435"/>
+              <a:gd name="connsiteY7" fmla="*/ 1860938 h 6791435"/>
+              <a:gd name="connsiteX8" fmla="*/ 81158 w 6791435"/>
+              <a:gd name="connsiteY8" fmla="*/ 6710277 h 6791435"/>
+              <a:gd name="connsiteX9" fmla="*/ 4919813 w 6791435"/>
+              <a:gd name="connsiteY9" fmla="*/ 6710277 h 6791435"/>
+              <a:gd name="connsiteX10" fmla="*/ 4838655 w 6791435"/>
+              <a:gd name="connsiteY10" fmla="*/ 6791435 h 6791435"/>
+              <a:gd name="connsiteX11" fmla="*/ 0 w 6791435"/>
+              <a:gd name="connsiteY11" fmla="*/ 6791435 h 6791435"/>
+            </a:gdLst>
+            <a:ahLst/>
+            <a:cxnLst>
+              <a:cxn ang="0">
+                <a:pos x="connsiteX0" y="connsiteY0"/>
+              </a:cxn>
+              <a:cxn ang="0">
+                <a:pos x="connsiteX1" y="connsiteY1"/>
+              </a:cxn>
+              <a:cxn ang="0">
+                <a:pos x="connsiteX2" y="connsiteY2"/>
+              </a:cxn>
+              <a:cxn ang="0">
+                <a:pos x="connsiteX3" y="connsiteY3"/>
+              </a:cxn>
+              <a:cxn ang="0">
+                <a:pos x="connsiteX4" y="connsiteY4"/>
+              </a:cxn>
+              <a:cxn ang="0">
+                <a:pos x="connsiteX5" y="connsiteY5"/>
+              </a:cxn>
+              <a:cxn ang="0">
+                <a:pos x="connsiteX6" y="connsiteY6"/>
+              </a:cxn>
+              <a:cxn ang="0">
+                <a:pos x="connsiteX7" y="connsiteY7"/>
+              </a:cxn>
+              <a:cxn ang="0">
+                <a:pos x="connsiteX8" y="connsiteY8"/>
+              </a:cxn>
+              <a:cxn ang="0">
+                <a:pos x="connsiteX9" y="connsiteY9"/>
+              </a:cxn>
+              <a:cxn ang="0">
+                <a:pos x="connsiteX10" y="connsiteY10"/>
+              </a:cxn>
+              <a:cxn ang="0">
+                <a:pos x="connsiteX11" y="connsiteY11"/>
+              </a:cxn>
+            </a:cxnLst>
+            <a:rect l="l" t="t" r="r" b="b"/>
+            <a:pathLst>
+              <a:path w="6791435" h="6791435">
+                <a:moveTo>
+                  <a:pt x="1860938" y="81158"/>
+                </a:moveTo>
+                <a:lnTo>
+                  <a:pt x="1942096" y="0"/>
+                </a:lnTo>
+                <a:lnTo>
+                  <a:pt x="6791435" y="0"/>
+                </a:lnTo>
+                <a:lnTo>
+                  <a:pt x="6791435" y="4838655"/>
+                </a:lnTo>
+                <a:lnTo>
+                  <a:pt x="6710277" y="4919813"/>
+                </a:lnTo>
+                <a:lnTo>
+                  <a:pt x="6710277" y="81158"/>
+                </a:lnTo>
+                <a:close/>
+                <a:moveTo>
+                  <a:pt x="0" y="1942096"/>
+                </a:moveTo>
+                <a:lnTo>
+                  <a:pt x="81158" y="1860938"/>
+                </a:lnTo>
+                <a:lnTo>
+                  <a:pt x="81158" y="6710277"/>
+                </a:lnTo>
+                <a:lnTo>
+                  <a:pt x="4919813" y="6710277"/>
+                </a:lnTo>
+                <a:lnTo>
+                  <a:pt x="4838655" y="6791435"/>
+                </a:lnTo>
+                <a:lnTo>
+                  <a:pt x="0" y="6791435"/>
+                </a:lnTo>
+                <a:close/>
+              </a:path>
+            </a:pathLst>
+          </a:custGeom>
+          <a:solidFill>
+            <a:srgbClr val="FFFFFF">
+              <a:alpha val="60000"/>
+            </a:srgbClr>
+          </a:solidFill>
+          <a:ln>
+            <a:noFill/>
+          </a:ln>
+        </p:spPr>
+        <p:style>
+          <a:lnRef idx="2">
+            <a:schemeClr val="accent1">
+              <a:shade val="50000"/>
+            </a:schemeClr>
+          </a:lnRef>
+          <a:fillRef idx="1">
+            <a:schemeClr val="accent1"/>
+          </a:fillRef>
+          <a:effectRef idx="0">
+            <a:schemeClr val="accent1"/>
+          </a:effectRef>
+          <a:fontRef idx="minor">
+            <a:schemeClr val="lt1"/>
+          </a:fontRef>
+        </p:style>
+        <p:txBody>
+          <a:bodyPr wrap="square" rtlCol="0" anchor="ctr">
+            <a:noAutofit/>
+          </a:bodyPr>
+          <a:lstStyle/>
+          <a:p>
+            <a:pPr algn="ctr"/>
+            <a:endParaRPr lang="en-US">
+              <a:solidFill>
+                <a:schemeClr val="tx1"/>
+              </a:solidFill>
+            </a:endParaRPr>
+          </a:p>
+        </p:txBody>
+      </p:sp>
+      <p:sp>
+        <p:nvSpPr>
+          <p:cNvPr id="25" name="Freeform: Shape 24">
+            <a:extLst>
+              <a:ext uri="{FF2B5EF4-FFF2-40B4-BE49-F238E27FC236}">
+                <a16:creationId xmlns:a16="http://schemas.microsoft.com/office/drawing/2014/main" id="{E07981EA-05A6-437C-88D7-B377B92B031D}"/>
+              </a:ext>
+              <a:ext uri="{C183D7F6-B498-43B3-948B-1728B52AA6E4}">
+                <adec:decorative xmlns:adec="http://schemas.microsoft.com/office/drawing/2017/decorative" val="1"/>
+              </a:ext>
+            </a:extLst>
+          </p:cNvPr>
+          <p:cNvSpPr>
+            <a:spLocks noGrp="1" noRot="1" noChangeAspect="1" noMove="1" noResize="1" noEditPoints="1" noAdjustHandles="1" noChangeArrowheads="1" noChangeShapeType="1" noTextEdit="1"/>
+          </p:cNvSpPr>
+          <p:nvPr>
+            <p:extLst>
+              <p:ext uri="{386F3935-93C4-4BCD-93E2-E3B085C9AB24}">
+                <p16:designElem xmlns:p16="http://schemas.microsoft.com/office/powerpoint/2015/main" val="1"/>
+              </p:ext>
+            </p:extLst>
+          </p:nvPr>
+        </p:nvSpPr>
+        <p:spPr>
+          <a:xfrm rot="2700000">
+            <a:off x="9629823" y="5457591"/>
+            <a:ext cx="2231794" cy="2568811"/>
+          </a:xfrm>
+          <a:custGeom>
+            <a:avLst/>
+            <a:gdLst>
+              <a:gd name="connsiteX0" fmla="*/ 0 w 2940086"/>
+              <a:gd name="connsiteY0" fmla="*/ 0 h 3384061"/>
+              <a:gd name="connsiteX1" fmla="*/ 2496112 w 2940086"/>
+              <a:gd name="connsiteY1" fmla="*/ 0 h 3384061"/>
+              <a:gd name="connsiteX2" fmla="*/ 2940086 w 2940086"/>
+              <a:gd name="connsiteY2" fmla="*/ 443975 h 3384061"/>
+              <a:gd name="connsiteX3" fmla="*/ 0 w 2940086"/>
+              <a:gd name="connsiteY3" fmla="*/ 3384061 h 3384061"/>
+            </a:gdLst>
+            <a:ahLst/>
+            <a:cxnLst>
+              <a:cxn ang="0">
+                <a:pos x="connsiteX0" y="connsiteY0"/>
+              </a:cxn>
+              <a:cxn ang="0">
+                <a:pos x="connsiteX1" y="connsiteY1"/>
+              </a:cxn>
+              <a:cxn ang="0">
+                <a:pos x="connsiteX2" y="connsiteY2"/>
+              </a:cxn>
+              <a:cxn ang="0">
+                <a:pos x="connsiteX3" y="connsiteY3"/>
+              </a:cxn>
+            </a:cxnLst>
+            <a:rect l="l" t="t" r="r" b="b"/>
+            <a:pathLst>
+              <a:path w="2940086" h="3384061">
+                <a:moveTo>
+                  <a:pt x="0" y="0"/>
+                </a:moveTo>
+                <a:lnTo>
+                  <a:pt x="2496112" y="0"/>
+                </a:lnTo>
+                <a:lnTo>
+                  <a:pt x="2940086" y="443975"/>
+                </a:lnTo>
+                <a:lnTo>
+                  <a:pt x="0" y="3384061"/>
+                </a:lnTo>
+                <a:close/>
+              </a:path>
+            </a:pathLst>
+          </a:custGeom>
+          <a:solidFill>
+            <a:schemeClr val="accent4">
+              <a:alpha val="40000"/>
+            </a:schemeClr>
+          </a:solidFill>
+          <a:ln>
+            <a:noFill/>
+          </a:ln>
+        </p:spPr>
+        <p:style>
+          <a:lnRef idx="2">
+            <a:schemeClr val="accent1">
+              <a:shade val="50000"/>
+            </a:schemeClr>
+          </a:lnRef>
+          <a:fillRef idx="1">
+            <a:schemeClr val="accent1"/>
+          </a:fillRef>
+          <a:effectRef idx="0">
+            <a:schemeClr val="accent1"/>
+          </a:effectRef>
+          <a:fontRef idx="minor">
+            <a:schemeClr val="lt1"/>
+          </a:fontRef>
+        </p:style>
+        <p:txBody>
+          <a:bodyPr wrap="square" rtlCol="0" anchor="ctr">
+            <a:noAutofit/>
+          </a:bodyPr>
+          <a:lstStyle/>
+          <a:p>
+            <a:pPr algn="ctr"/>
+            <a:endParaRPr lang="en-US"/>
+          </a:p>
+        </p:txBody>
+      </p:sp>
+      <p:sp>
+        <p:nvSpPr>
+          <p:cNvPr id="27" name="Rectangle 26">
+            <a:extLst>
+              <a:ext uri="{FF2B5EF4-FFF2-40B4-BE49-F238E27FC236}">
+                <a16:creationId xmlns:a16="http://schemas.microsoft.com/office/drawing/2014/main" id="{15E3C750-986E-4769-B1AE-49289FBEE757}"/>
+              </a:ext>
+              <a:ext uri="{C183D7F6-B498-43B3-948B-1728B52AA6E4}">
+                <adec:decorative xmlns:adec="http://schemas.microsoft.com/office/drawing/2017/decorative" val="1"/>
+              </a:ext>
+            </a:extLst>
+          </p:cNvPr>
+          <p:cNvSpPr>
+            <a:spLocks noGrp="1" noRot="1" noChangeAspect="1" noMove="1" noResize="1" noEditPoints="1" noAdjustHandles="1" noChangeArrowheads="1" noChangeShapeType="1" noTextEdit="1"/>
+          </p:cNvSpPr>
+          <p:nvPr>
+            <p:extLst>
+              <p:ext uri="{386F3935-93C4-4BCD-93E2-E3B085C9AB24}">
+                <p16:designElem xmlns:p16="http://schemas.microsoft.com/office/powerpoint/2015/main" val="1"/>
+              </p:ext>
+            </p:extLst>
+          </p:nvPr>
+        </p:nvSpPr>
+        <p:spPr>
+          <a:xfrm rot="2700000">
+            <a:off x="9720059" y="5243545"/>
+            <a:ext cx="959985" cy="959985"/>
+          </a:xfrm>
+          <a:prstGeom prst="rect">
+            <a:avLst/>
+          </a:prstGeom>
+          <a:solidFill>
+            <a:schemeClr val="accent4">
+              <a:alpha val="40000"/>
+            </a:schemeClr>
+          </a:solidFill>
+          <a:ln>
+            <a:noFill/>
+          </a:ln>
+        </p:spPr>
+        <p:style>
+          <a:lnRef idx="2">
+            <a:schemeClr val="accent1">
+              <a:shade val="50000"/>
+            </a:schemeClr>
+          </a:lnRef>
+          <a:fillRef idx="1">
+            <a:schemeClr val="accent1"/>
+          </a:fillRef>
+          <a:effectRef idx="0">
+            <a:schemeClr val="accent1"/>
+          </a:effectRef>
+          <a:fontRef idx="minor">
+            <a:schemeClr val="lt1"/>
+          </a:fontRef>
+        </p:style>
+        <p:txBody>
+          <a:bodyPr wrap="square" rtlCol="0" anchor="ctr">
+            <a:noAutofit/>
+          </a:bodyPr>
+          <a:lstStyle/>
+          <a:p>
+            <a:pPr algn="ctr"/>
+            <a:endParaRPr lang="en-US"/>
+          </a:p>
+        </p:txBody>
+      </p:sp>
+    </p:spTree>
+    <p:extLst>
+      <p:ext uri="{BB962C8B-B14F-4D97-AF65-F5344CB8AC3E}">
+        <p14:creationId xmlns:p14="http://schemas.microsoft.com/office/powerpoint/2010/main" val="1665447023"/>
+      </p:ext>
+    </p:extLst>
+  </p:cSld>
+  <p:clrMapOvr>
+    <a:masterClrMapping/>
+  </p:clrMapOvr>
+</p:sld>
+</file>
+
 <file path=ppt/slides/slide2.xml><?xml version="1.0" encoding="utf-8"?>
 <p:sld xmlns:a="http://schemas.openxmlformats.org/drawingml/2006/main" xmlns:r="http://schemas.openxmlformats.org/officeDocument/2006/relationships" xmlns:p="http://schemas.openxmlformats.org/presentationml/2006/main">
   <p:cSld>

</xml_diff>